<commit_message>
modify splash and model figure
</commit_message>
<xml_diff>
--- a/figs/splash0/splah0.pptx
+++ b/figs/splash0/splah0.pptx
@@ -7,6 +7,7 @@
   <p:sldIdLst>
     <p:sldId id="256" r:id="rId2"/>
     <p:sldId id="257" r:id="rId3"/>
+    <p:sldId id="258" r:id="rId4"/>
   </p:sldIdLst>
   <p:sldSz cx="9144000" cy="6858000" type="screen4x3"/>
   <p:notesSz cx="6858000" cy="9144000"/>
@@ -289,7 +290,7 @@
           <a:p>
             <a:fld id="{732FA3E5-5165-384F-AF96-B8680DAF2686}" type="datetimeFigureOut">
               <a:rPr lang="en-US" smtClean="0"/>
-              <a:t>4/15/15</a:t>
+              <a:t>4/16/15</a:t>
             </a:fld>
             <a:endParaRPr lang="en-US"/>
           </a:p>
@@ -459,7 +460,7 @@
           <a:p>
             <a:fld id="{732FA3E5-5165-384F-AF96-B8680DAF2686}" type="datetimeFigureOut">
               <a:rPr lang="en-US" smtClean="0"/>
-              <a:t>4/15/15</a:t>
+              <a:t>4/16/15</a:t>
             </a:fld>
             <a:endParaRPr lang="en-US"/>
           </a:p>
@@ -639,7 +640,7 @@
           <a:p>
             <a:fld id="{732FA3E5-5165-384F-AF96-B8680DAF2686}" type="datetimeFigureOut">
               <a:rPr lang="en-US" smtClean="0"/>
-              <a:t>4/15/15</a:t>
+              <a:t>4/16/15</a:t>
             </a:fld>
             <a:endParaRPr lang="en-US"/>
           </a:p>
@@ -809,7 +810,7 @@
           <a:p>
             <a:fld id="{732FA3E5-5165-384F-AF96-B8680DAF2686}" type="datetimeFigureOut">
               <a:rPr lang="en-US" smtClean="0"/>
-              <a:t>4/15/15</a:t>
+              <a:t>4/16/15</a:t>
             </a:fld>
             <a:endParaRPr lang="en-US"/>
           </a:p>
@@ -1055,7 +1056,7 @@
           <a:p>
             <a:fld id="{732FA3E5-5165-384F-AF96-B8680DAF2686}" type="datetimeFigureOut">
               <a:rPr lang="en-US" smtClean="0"/>
-              <a:t>4/15/15</a:t>
+              <a:t>4/16/15</a:t>
             </a:fld>
             <a:endParaRPr lang="en-US"/>
           </a:p>
@@ -1343,7 +1344,7 @@
           <a:p>
             <a:fld id="{732FA3E5-5165-384F-AF96-B8680DAF2686}" type="datetimeFigureOut">
               <a:rPr lang="en-US" smtClean="0"/>
-              <a:t>4/15/15</a:t>
+              <a:t>4/16/15</a:t>
             </a:fld>
             <a:endParaRPr lang="en-US"/>
           </a:p>
@@ -1765,7 +1766,7 @@
           <a:p>
             <a:fld id="{732FA3E5-5165-384F-AF96-B8680DAF2686}" type="datetimeFigureOut">
               <a:rPr lang="en-US" smtClean="0"/>
-              <a:t>4/15/15</a:t>
+              <a:t>4/16/15</a:t>
             </a:fld>
             <a:endParaRPr lang="en-US"/>
           </a:p>
@@ -1883,7 +1884,7 @@
           <a:p>
             <a:fld id="{732FA3E5-5165-384F-AF96-B8680DAF2686}" type="datetimeFigureOut">
               <a:rPr lang="en-US" smtClean="0"/>
-              <a:t>4/15/15</a:t>
+              <a:t>4/16/15</a:t>
             </a:fld>
             <a:endParaRPr lang="en-US"/>
           </a:p>
@@ -1978,7 +1979,7 @@
           <a:p>
             <a:fld id="{732FA3E5-5165-384F-AF96-B8680DAF2686}" type="datetimeFigureOut">
               <a:rPr lang="en-US" smtClean="0"/>
-              <a:t>4/15/15</a:t>
+              <a:t>4/16/15</a:t>
             </a:fld>
             <a:endParaRPr lang="en-US"/>
           </a:p>
@@ -2255,7 +2256,7 @@
           <a:p>
             <a:fld id="{732FA3E5-5165-384F-AF96-B8680DAF2686}" type="datetimeFigureOut">
               <a:rPr lang="en-US" smtClean="0"/>
-              <a:t>4/15/15</a:t>
+              <a:t>4/16/15</a:t>
             </a:fld>
             <a:endParaRPr lang="en-US"/>
           </a:p>
@@ -2508,7 +2509,7 @@
           <a:p>
             <a:fld id="{732FA3E5-5165-384F-AF96-B8680DAF2686}" type="datetimeFigureOut">
               <a:rPr lang="en-US" smtClean="0"/>
-              <a:t>4/15/15</a:t>
+              <a:t>4/16/15</a:t>
             </a:fld>
             <a:endParaRPr lang="en-US"/>
           </a:p>
@@ -2721,7 +2722,7 @@
           <a:p>
             <a:fld id="{732FA3E5-5165-384F-AF96-B8680DAF2686}" type="datetimeFigureOut">
               <a:rPr lang="en-US" smtClean="0"/>
-              <a:t>4/15/15</a:t>
+              <a:t>4/16/15</a:t>
             </a:fld>
             <a:endParaRPr lang="en-US"/>
           </a:p>
@@ -3387,6 +3388,1533 @@
     <p:extLst>
       <p:ext uri="{BB962C8B-B14F-4D97-AF65-F5344CB8AC3E}">
         <p14:creationId xmlns:p14="http://schemas.microsoft.com/office/powerpoint/2010/main" val="1406398090"/>
+      </p:ext>
+    </p:extLst>
+  </p:cSld>
+  <p:clrMapOvr>
+    <a:masterClrMapping/>
+  </p:clrMapOvr>
+</p:sld>
+</file>
+
+<file path=ppt/slides/slide3.xml><?xml version="1.0" encoding="utf-8"?>
+<p:sld xmlns:a="http://schemas.openxmlformats.org/drawingml/2006/main" xmlns:r="http://schemas.openxmlformats.org/officeDocument/2006/relationships" xmlns:p="http://schemas.openxmlformats.org/presentationml/2006/main">
+  <p:cSld>
+    <p:spTree>
+      <p:nvGrpSpPr>
+        <p:cNvPr id="1" name=""/>
+        <p:cNvGrpSpPr/>
+        <p:nvPr/>
+      </p:nvGrpSpPr>
+      <p:grpSpPr>
+        <a:xfrm>
+          <a:off x="0" y="0"/>
+          <a:ext cx="0" cy="0"/>
+          <a:chOff x="0" y="0"/>
+          <a:chExt cx="0" cy="0"/>
+        </a:xfrm>
+      </p:grpSpPr>
+      <p:grpSp>
+        <p:nvGrpSpPr>
+          <p:cNvPr id="174" name="Group 173"/>
+          <p:cNvGrpSpPr/>
+          <p:nvPr/>
+        </p:nvGrpSpPr>
+        <p:grpSpPr>
+          <a:xfrm>
+            <a:off x="863600" y="944364"/>
+            <a:ext cx="7376345" cy="5507236"/>
+            <a:chOff x="863600" y="944364"/>
+            <a:chExt cx="7376345" cy="5507236"/>
+          </a:xfrm>
+        </p:grpSpPr>
+        <p:pic>
+          <p:nvPicPr>
+            <p:cNvPr id="126" name="Picture 125" descr="original.jpg"/>
+            <p:cNvPicPr>
+              <a:picLocks noChangeAspect="1"/>
+            </p:cNvPicPr>
+            <p:nvPr/>
+          </p:nvPicPr>
+          <p:blipFill>
+            <a:blip r:embed="rId2">
+              <a:extLst>
+                <a:ext uri="{BEBA8EAE-BF5A-486C-A8C5-ECC9F3942E4B}">
+                  <a14:imgProps xmlns:a14="http://schemas.microsoft.com/office/drawing/2010/main">
+                    <a14:imgLayer r:embed="rId3">
+                      <a14:imgEffect>
+                        <a14:saturation sat="165000"/>
+                      </a14:imgEffect>
+                      <a14:imgEffect>
+                        <a14:brightnessContrast bright="-20000"/>
+                      </a14:imgEffect>
+                    </a14:imgLayer>
+                  </a14:imgProps>
+                </a:ext>
+                <a:ext uri="{28A0092B-C50C-407E-A947-70E740481C1C}">
+                  <a14:useLocalDpi xmlns:a14="http://schemas.microsoft.com/office/drawing/2010/main" val="0"/>
+                </a:ext>
+              </a:extLst>
+            </a:blip>
+            <a:stretch>
+              <a:fillRect/>
+            </a:stretch>
+          </p:blipFill>
+          <p:spPr>
+            <a:xfrm>
+              <a:off x="863600" y="3606800"/>
+              <a:ext cx="2844800" cy="2844800"/>
+            </a:xfrm>
+            <a:prstGeom prst="rect">
+              <a:avLst/>
+            </a:prstGeom>
+            <a:scene3d>
+              <a:camera prst="perspectiveFront" fov="0">
+                <a:rot lat="18095192" lon="1120687" rev="20479293"/>
+              </a:camera>
+              <a:lightRig rig="threePt" dir="t"/>
+            </a:scene3d>
+            <a:sp3d/>
+          </p:spPr>
+        </p:pic>
+        <p:sp>
+          <p:nvSpPr>
+            <p:cNvPr id="127" name="TextBox 126"/>
+            <p:cNvSpPr txBox="1"/>
+            <p:nvPr/>
+          </p:nvSpPr>
+          <p:spPr>
+            <a:xfrm>
+              <a:off x="1516548" y="944364"/>
+              <a:ext cx="1538903" cy="523220"/>
+            </a:xfrm>
+            <a:prstGeom prst="rect">
+              <a:avLst/>
+            </a:prstGeom>
+            <a:noFill/>
+          </p:spPr>
+          <p:txBody>
+            <a:bodyPr wrap="none" rtlCol="0">
+              <a:spAutoFit/>
+            </a:bodyPr>
+            <a:lstStyle/>
+            <a:p>
+              <a:r>
+                <a:rPr lang="en-US" sz="2800" dirty="0" smtClean="0"/>
+                <a:t>“PANDA”</a:t>
+              </a:r>
+              <a:endParaRPr lang="en-US" sz="2800" dirty="0"/>
+            </a:p>
+          </p:txBody>
+        </p:sp>
+        <p:pic>
+          <p:nvPicPr>
+            <p:cNvPr id="128" name="Picture 127" descr="panda.jpg"/>
+            <p:cNvPicPr>
+              <a:picLocks noChangeAspect="1"/>
+            </p:cNvPicPr>
+            <p:nvPr/>
+          </p:nvPicPr>
+          <p:blipFill>
+            <a:blip r:embed="rId4">
+              <a:extLst>
+                <a:ext uri="{28A0092B-C50C-407E-A947-70E740481C1C}">
+                  <a14:useLocalDpi xmlns:a14="http://schemas.microsoft.com/office/drawing/2010/main" val="0"/>
+                </a:ext>
+              </a:extLst>
+            </a:blip>
+            <a:stretch>
+              <a:fillRect/>
+            </a:stretch>
+          </p:blipFill>
+          <p:spPr>
+            <a:xfrm>
+              <a:off x="5953945" y="1130671"/>
+              <a:ext cx="2286000" cy="2286000"/>
+            </a:xfrm>
+            <a:prstGeom prst="rect">
+              <a:avLst/>
+            </a:prstGeom>
+          </p:spPr>
+        </p:pic>
+        <p:sp>
+          <p:nvSpPr>
+            <p:cNvPr id="129" name="右箭头 293"/>
+            <p:cNvSpPr>
+              <a:spLocks noChangeAspect="1"/>
+            </p:cNvSpPr>
+            <p:nvPr/>
+          </p:nvSpPr>
+          <p:spPr>
+            <a:xfrm>
+              <a:off x="4085724" y="3223260"/>
+              <a:ext cx="1371600" cy="411480"/>
+            </a:xfrm>
+            <a:prstGeom prst="rightArrow">
+              <a:avLst/>
+            </a:prstGeom>
+            <a:ln w="19050" cmpd="sng"/>
+          </p:spPr>
+          <p:style>
+            <a:lnRef idx="2">
+              <a:schemeClr val="dk1"/>
+            </a:lnRef>
+            <a:fillRef idx="1">
+              <a:schemeClr val="lt1"/>
+            </a:fillRef>
+            <a:effectRef idx="0">
+              <a:schemeClr val="dk1"/>
+            </a:effectRef>
+            <a:fontRef idx="minor">
+              <a:schemeClr val="dk1"/>
+            </a:fontRef>
+          </p:style>
+          <p:txBody>
+            <a:bodyPr rot="0" spcFirstLastPara="0" vert="horz" wrap="square" lIns="91440" tIns="45720" rIns="91440" bIns="45720" numCol="1" spcCol="0" rtlCol="0" fromWordArt="0" anchor="ctr" anchorCtr="0" forceAA="0" compatLnSpc="1">
+              <a:prstTxWarp prst="textNoShape">
+                <a:avLst/>
+              </a:prstTxWarp>
+              <a:noAutofit/>
+            </a:bodyPr>
+            <a:lstStyle/>
+            <a:p>
+              <a:endParaRPr lang="en-US"/>
+            </a:p>
+          </p:txBody>
+        </p:sp>
+        <p:grpSp>
+          <p:nvGrpSpPr>
+            <p:cNvPr id="171" name="Group 170"/>
+            <p:cNvGrpSpPr/>
+            <p:nvPr/>
+          </p:nvGrpSpPr>
+          <p:grpSpPr>
+            <a:xfrm>
+              <a:off x="1143000" y="1467584"/>
+              <a:ext cx="2286000" cy="3200400"/>
+              <a:chOff x="1143000" y="1467584"/>
+              <a:chExt cx="2286000" cy="3200400"/>
+            </a:xfrm>
+          </p:grpSpPr>
+          <p:sp>
+            <p:nvSpPr>
+              <p:cNvPr id="76" name="流程图: 联系 127"/>
+              <p:cNvSpPr/>
+              <p:nvPr/>
+            </p:nvSpPr>
+            <p:spPr>
+              <a:xfrm>
+                <a:off x="1143000" y="2381984"/>
+                <a:ext cx="457200" cy="457200"/>
+              </a:xfrm>
+              <a:prstGeom prst="flowChartConnector">
+                <a:avLst/>
+              </a:prstGeom>
+              <a:ln w="19050" cmpd="sng">
+                <a:solidFill>
+                  <a:srgbClr val="000000"/>
+                </a:solidFill>
+              </a:ln>
+            </p:spPr>
+            <p:style>
+              <a:lnRef idx="2">
+                <a:schemeClr val="dk1"/>
+              </a:lnRef>
+              <a:fillRef idx="1">
+                <a:schemeClr val="lt1"/>
+              </a:fillRef>
+              <a:effectRef idx="0">
+                <a:schemeClr val="dk1"/>
+              </a:effectRef>
+              <a:fontRef idx="minor">
+                <a:schemeClr val="dk1"/>
+              </a:fontRef>
+            </p:style>
+            <p:txBody>
+              <a:bodyPr rot="0" spcFirstLastPara="0" vert="horz" wrap="square" lIns="91440" tIns="45720" rIns="91440" bIns="45720" numCol="1" spcCol="0" rtlCol="0" fromWordArt="0" anchor="ctr" anchorCtr="0" forceAA="0" compatLnSpc="1">
+                <a:prstTxWarp prst="textNoShape">
+                  <a:avLst/>
+                </a:prstTxWarp>
+                <a:noAutofit/>
+              </a:bodyPr>
+              <a:lstStyle/>
+              <a:p>
+                <a:endParaRPr lang="en-US"/>
+              </a:p>
+            </p:txBody>
+          </p:sp>
+          <p:sp>
+            <p:nvSpPr>
+              <p:cNvPr id="77" name="流程图: 联系 128"/>
+              <p:cNvSpPr/>
+              <p:nvPr/>
+            </p:nvSpPr>
+            <p:spPr>
+              <a:xfrm>
+                <a:off x="2057400" y="2381984"/>
+                <a:ext cx="457200" cy="457200"/>
+              </a:xfrm>
+              <a:prstGeom prst="flowChartConnector">
+                <a:avLst/>
+              </a:prstGeom>
+              <a:ln w="19050" cmpd="sng">
+                <a:solidFill>
+                  <a:srgbClr val="000000"/>
+                </a:solidFill>
+              </a:ln>
+            </p:spPr>
+            <p:style>
+              <a:lnRef idx="2">
+                <a:schemeClr val="dk1"/>
+              </a:lnRef>
+              <a:fillRef idx="1">
+                <a:schemeClr val="lt1"/>
+              </a:fillRef>
+              <a:effectRef idx="0">
+                <a:schemeClr val="dk1"/>
+              </a:effectRef>
+              <a:fontRef idx="minor">
+                <a:schemeClr val="dk1"/>
+              </a:fontRef>
+            </p:style>
+            <p:txBody>
+              <a:bodyPr rot="0" spcFirstLastPara="0" vert="horz" wrap="square" lIns="91440" tIns="45720" rIns="91440" bIns="45720" numCol="1" spcCol="0" rtlCol="0" fromWordArt="0" anchor="ctr" anchorCtr="0" forceAA="0" compatLnSpc="1">
+                <a:prstTxWarp prst="textNoShape">
+                  <a:avLst/>
+                </a:prstTxWarp>
+                <a:noAutofit/>
+              </a:bodyPr>
+              <a:lstStyle/>
+              <a:p>
+                <a:endParaRPr lang="en-US"/>
+              </a:p>
+            </p:txBody>
+          </p:sp>
+          <p:sp>
+            <p:nvSpPr>
+              <p:cNvPr id="78" name="流程图: 联系 129"/>
+              <p:cNvSpPr/>
+              <p:nvPr/>
+            </p:nvSpPr>
+            <p:spPr>
+              <a:xfrm>
+                <a:off x="2971800" y="2381984"/>
+                <a:ext cx="457200" cy="457200"/>
+              </a:xfrm>
+              <a:prstGeom prst="flowChartConnector">
+                <a:avLst/>
+              </a:prstGeom>
+              <a:solidFill>
+                <a:srgbClr val="FFFFFF"/>
+              </a:solidFill>
+              <a:ln w="19050" cmpd="sng">
+                <a:solidFill>
+                  <a:srgbClr val="000000"/>
+                </a:solidFill>
+              </a:ln>
+            </p:spPr>
+            <p:style>
+              <a:lnRef idx="2">
+                <a:schemeClr val="dk1"/>
+              </a:lnRef>
+              <a:fillRef idx="1">
+                <a:schemeClr val="lt1"/>
+              </a:fillRef>
+              <a:effectRef idx="0">
+                <a:schemeClr val="dk1"/>
+              </a:effectRef>
+              <a:fontRef idx="minor">
+                <a:schemeClr val="dk1"/>
+              </a:fontRef>
+            </p:style>
+            <p:txBody>
+              <a:bodyPr rot="0" spcFirstLastPara="0" vert="horz" wrap="square" lIns="91440" tIns="45720" rIns="91440" bIns="45720" numCol="1" spcCol="0" rtlCol="0" fromWordArt="0" anchor="ctr" anchorCtr="0" forceAA="0" compatLnSpc="1">
+                <a:prstTxWarp prst="textNoShape">
+                  <a:avLst/>
+                </a:prstTxWarp>
+                <a:noAutofit/>
+              </a:bodyPr>
+              <a:lstStyle/>
+              <a:p>
+                <a:endParaRPr lang="en-US"/>
+              </a:p>
+            </p:txBody>
+          </p:sp>
+          <p:sp>
+            <p:nvSpPr>
+              <p:cNvPr id="79" name="流程图: 联系 130"/>
+              <p:cNvSpPr/>
+              <p:nvPr/>
+            </p:nvSpPr>
+            <p:spPr>
+              <a:xfrm>
+                <a:off x="2057400" y="1467584"/>
+                <a:ext cx="457200" cy="457200"/>
+              </a:xfrm>
+              <a:prstGeom prst="flowChartConnector">
+                <a:avLst/>
+              </a:prstGeom>
+              <a:ln w="19050" cmpd="sng">
+                <a:solidFill>
+                  <a:srgbClr val="000000"/>
+                </a:solidFill>
+              </a:ln>
+            </p:spPr>
+            <p:style>
+              <a:lnRef idx="2">
+                <a:schemeClr val="dk1"/>
+              </a:lnRef>
+              <a:fillRef idx="1">
+                <a:schemeClr val="lt1"/>
+              </a:fillRef>
+              <a:effectRef idx="0">
+                <a:schemeClr val="dk1"/>
+              </a:effectRef>
+              <a:fontRef idx="minor">
+                <a:schemeClr val="dk1"/>
+              </a:fontRef>
+            </p:style>
+            <p:txBody>
+              <a:bodyPr rot="0" spcFirstLastPara="0" vert="horz" wrap="square" lIns="91440" tIns="45720" rIns="91440" bIns="45720" numCol="1" spcCol="0" rtlCol="0" fromWordArt="0" anchor="ctr" anchorCtr="0" forceAA="0" compatLnSpc="1">
+                <a:prstTxWarp prst="textNoShape">
+                  <a:avLst/>
+                </a:prstTxWarp>
+                <a:noAutofit/>
+              </a:bodyPr>
+              <a:lstStyle/>
+              <a:p>
+                <a:endParaRPr lang="en-US"/>
+              </a:p>
+            </p:txBody>
+          </p:sp>
+          <p:sp>
+            <p:nvSpPr>
+              <p:cNvPr id="80" name="流程图: 联系 134"/>
+              <p:cNvSpPr/>
+              <p:nvPr/>
+            </p:nvSpPr>
+            <p:spPr>
+              <a:xfrm>
+                <a:off x="1143000" y="4210784"/>
+                <a:ext cx="457200" cy="457200"/>
+              </a:xfrm>
+              <a:prstGeom prst="flowChartConnector">
+                <a:avLst/>
+              </a:prstGeom>
+              <a:ln w="19050" cmpd="sng">
+                <a:solidFill>
+                  <a:srgbClr val="000000"/>
+                </a:solidFill>
+              </a:ln>
+            </p:spPr>
+            <p:style>
+              <a:lnRef idx="2">
+                <a:schemeClr val="dk1"/>
+              </a:lnRef>
+              <a:fillRef idx="1">
+                <a:schemeClr val="lt1"/>
+              </a:fillRef>
+              <a:effectRef idx="0">
+                <a:schemeClr val="dk1"/>
+              </a:effectRef>
+              <a:fontRef idx="minor">
+                <a:schemeClr val="dk1"/>
+              </a:fontRef>
+            </p:style>
+            <p:txBody>
+              <a:bodyPr rot="0" spcFirstLastPara="0" vert="horz" wrap="square" lIns="91440" tIns="45720" rIns="91440" bIns="45720" numCol="1" spcCol="0" rtlCol="0" fromWordArt="0" anchor="ctr" anchorCtr="0" forceAA="0" compatLnSpc="1">
+                <a:prstTxWarp prst="textNoShape">
+                  <a:avLst/>
+                </a:prstTxWarp>
+                <a:noAutofit/>
+              </a:bodyPr>
+              <a:lstStyle/>
+              <a:p>
+                <a:endParaRPr lang="en-US"/>
+              </a:p>
+            </p:txBody>
+          </p:sp>
+          <p:sp>
+            <p:nvSpPr>
+              <p:cNvPr id="81" name="流程图: 联系 136"/>
+              <p:cNvSpPr/>
+              <p:nvPr/>
+            </p:nvSpPr>
+            <p:spPr>
+              <a:xfrm>
+                <a:off x="2057400" y="4210784"/>
+                <a:ext cx="457200" cy="457200"/>
+              </a:xfrm>
+              <a:prstGeom prst="flowChartConnector">
+                <a:avLst/>
+              </a:prstGeom>
+              <a:ln w="19050" cmpd="sng">
+                <a:solidFill>
+                  <a:srgbClr val="000000"/>
+                </a:solidFill>
+              </a:ln>
+            </p:spPr>
+            <p:style>
+              <a:lnRef idx="2">
+                <a:schemeClr val="dk1"/>
+              </a:lnRef>
+              <a:fillRef idx="1">
+                <a:schemeClr val="lt1"/>
+              </a:fillRef>
+              <a:effectRef idx="0">
+                <a:schemeClr val="dk1"/>
+              </a:effectRef>
+              <a:fontRef idx="minor">
+                <a:schemeClr val="dk1"/>
+              </a:fontRef>
+            </p:style>
+            <p:txBody>
+              <a:bodyPr rot="0" spcFirstLastPara="0" vert="horz" wrap="square" lIns="91440" tIns="45720" rIns="91440" bIns="45720" numCol="1" spcCol="0" rtlCol="0" fromWordArt="0" anchor="ctr" anchorCtr="0" forceAA="0" compatLnSpc="1">
+                <a:prstTxWarp prst="textNoShape">
+                  <a:avLst/>
+                </a:prstTxWarp>
+                <a:noAutofit/>
+              </a:bodyPr>
+              <a:lstStyle/>
+              <a:p>
+                <a:endParaRPr lang="en-US"/>
+              </a:p>
+            </p:txBody>
+          </p:sp>
+          <p:sp>
+            <p:nvSpPr>
+              <p:cNvPr id="82" name="流程图: 联系 137"/>
+              <p:cNvSpPr/>
+              <p:nvPr/>
+            </p:nvSpPr>
+            <p:spPr>
+              <a:xfrm>
+                <a:off x="2971800" y="4210784"/>
+                <a:ext cx="457200" cy="457200"/>
+              </a:xfrm>
+              <a:prstGeom prst="flowChartConnector">
+                <a:avLst/>
+              </a:prstGeom>
+              <a:ln w="19050" cmpd="sng">
+                <a:solidFill>
+                  <a:srgbClr val="000000"/>
+                </a:solidFill>
+              </a:ln>
+            </p:spPr>
+            <p:style>
+              <a:lnRef idx="2">
+                <a:schemeClr val="dk1"/>
+              </a:lnRef>
+              <a:fillRef idx="1">
+                <a:schemeClr val="lt1"/>
+              </a:fillRef>
+              <a:effectRef idx="0">
+                <a:schemeClr val="dk1"/>
+              </a:effectRef>
+              <a:fontRef idx="minor">
+                <a:schemeClr val="dk1"/>
+              </a:fontRef>
+            </p:style>
+            <p:txBody>
+              <a:bodyPr rot="0" spcFirstLastPara="0" vert="horz" wrap="square" lIns="91440" tIns="45720" rIns="91440" bIns="45720" numCol="1" spcCol="0" rtlCol="0" fromWordArt="0" anchor="ctr" anchorCtr="0" forceAA="0" compatLnSpc="1">
+                <a:prstTxWarp prst="textNoShape">
+                  <a:avLst/>
+                </a:prstTxWarp>
+                <a:noAutofit/>
+              </a:bodyPr>
+              <a:lstStyle/>
+              <a:p>
+                <a:endParaRPr lang="en-US"/>
+              </a:p>
+            </p:txBody>
+          </p:sp>
+          <p:sp>
+            <p:nvSpPr>
+              <p:cNvPr id="83" name="流程图: 联系 139"/>
+              <p:cNvSpPr/>
+              <p:nvPr/>
+            </p:nvSpPr>
+            <p:spPr>
+              <a:xfrm>
+                <a:off x="1143000" y="3296384"/>
+                <a:ext cx="457200" cy="457200"/>
+              </a:xfrm>
+              <a:prstGeom prst="flowChartConnector">
+                <a:avLst/>
+              </a:prstGeom>
+              <a:noFill/>
+              <a:ln w="19050" cmpd="sng">
+                <a:solidFill>
+                  <a:srgbClr val="000000"/>
+                </a:solidFill>
+              </a:ln>
+            </p:spPr>
+            <p:style>
+              <a:lnRef idx="2">
+                <a:schemeClr val="dk1"/>
+              </a:lnRef>
+              <a:fillRef idx="1">
+                <a:schemeClr val="lt1"/>
+              </a:fillRef>
+              <a:effectRef idx="0">
+                <a:schemeClr val="dk1"/>
+              </a:effectRef>
+              <a:fontRef idx="minor">
+                <a:schemeClr val="dk1"/>
+              </a:fontRef>
+            </p:style>
+            <p:txBody>
+              <a:bodyPr rot="0" spcFirstLastPara="0" vert="horz" wrap="square" lIns="91440" tIns="45720" rIns="91440" bIns="45720" numCol="1" spcCol="0" rtlCol="0" fromWordArt="0" anchor="ctr" anchorCtr="0" forceAA="0" compatLnSpc="1">
+                <a:prstTxWarp prst="textNoShape">
+                  <a:avLst/>
+                </a:prstTxWarp>
+                <a:noAutofit/>
+              </a:bodyPr>
+              <a:lstStyle/>
+              <a:p>
+                <a:endParaRPr lang="en-US"/>
+              </a:p>
+            </p:txBody>
+          </p:sp>
+          <p:sp>
+            <p:nvSpPr>
+              <p:cNvPr id="84" name="流程图: 联系 140"/>
+              <p:cNvSpPr/>
+              <p:nvPr/>
+            </p:nvSpPr>
+            <p:spPr>
+              <a:xfrm>
+                <a:off x="2057400" y="3296384"/>
+                <a:ext cx="457200" cy="457200"/>
+              </a:xfrm>
+              <a:prstGeom prst="flowChartConnector">
+                <a:avLst/>
+              </a:prstGeom>
+              <a:solidFill>
+                <a:schemeClr val="tx1">
+                  <a:lumMod val="65000"/>
+                  <a:lumOff val="35000"/>
+                </a:schemeClr>
+              </a:solidFill>
+              <a:ln w="19050" cmpd="sng">
+                <a:solidFill>
+                  <a:srgbClr val="000000"/>
+                </a:solidFill>
+              </a:ln>
+            </p:spPr>
+            <p:style>
+              <a:lnRef idx="2">
+                <a:schemeClr val="dk1"/>
+              </a:lnRef>
+              <a:fillRef idx="1">
+                <a:schemeClr val="lt1"/>
+              </a:fillRef>
+              <a:effectRef idx="0">
+                <a:schemeClr val="dk1"/>
+              </a:effectRef>
+              <a:fontRef idx="minor">
+                <a:schemeClr val="dk1"/>
+              </a:fontRef>
+            </p:style>
+            <p:txBody>
+              <a:bodyPr rot="0" spcFirstLastPara="0" vert="horz" wrap="square" lIns="91440" tIns="45720" rIns="91440" bIns="45720" numCol="1" spcCol="0" rtlCol="0" fromWordArt="0" anchor="ctr" anchorCtr="0" forceAA="0" compatLnSpc="1">
+                <a:prstTxWarp prst="textNoShape">
+                  <a:avLst/>
+                </a:prstTxWarp>
+                <a:noAutofit/>
+              </a:bodyPr>
+              <a:lstStyle/>
+              <a:p>
+                <a:endParaRPr lang="en-US"/>
+              </a:p>
+            </p:txBody>
+          </p:sp>
+          <p:sp>
+            <p:nvSpPr>
+              <p:cNvPr id="85" name="流程图: 联系 141"/>
+              <p:cNvSpPr/>
+              <p:nvPr/>
+            </p:nvSpPr>
+            <p:spPr>
+              <a:xfrm>
+                <a:off x="2971800" y="3296384"/>
+                <a:ext cx="457200" cy="457200"/>
+              </a:xfrm>
+              <a:prstGeom prst="flowChartConnector">
+                <a:avLst/>
+              </a:prstGeom>
+              <a:ln w="19050" cmpd="sng">
+                <a:solidFill>
+                  <a:srgbClr val="000000"/>
+                </a:solidFill>
+              </a:ln>
+            </p:spPr>
+            <p:style>
+              <a:lnRef idx="2">
+                <a:schemeClr val="dk1"/>
+              </a:lnRef>
+              <a:fillRef idx="1">
+                <a:schemeClr val="lt1"/>
+              </a:fillRef>
+              <a:effectRef idx="0">
+                <a:schemeClr val="dk1"/>
+              </a:effectRef>
+              <a:fontRef idx="minor">
+                <a:schemeClr val="dk1"/>
+              </a:fontRef>
+            </p:style>
+            <p:txBody>
+              <a:bodyPr rot="0" spcFirstLastPara="0" vert="horz" wrap="square" lIns="91440" tIns="45720" rIns="91440" bIns="45720" numCol="1" spcCol="0" rtlCol="0" fromWordArt="0" anchor="ctr" anchorCtr="0" forceAA="0" compatLnSpc="1">
+                <a:prstTxWarp prst="textNoShape">
+                  <a:avLst/>
+                </a:prstTxWarp>
+                <a:noAutofit/>
+              </a:bodyPr>
+              <a:lstStyle/>
+              <a:p>
+                <a:endParaRPr lang="en-US"/>
+              </a:p>
+            </p:txBody>
+          </p:sp>
+          <p:cxnSp>
+            <p:nvCxnSpPr>
+              <p:cNvPr id="87" name="Straight Arrow Connector 86"/>
+              <p:cNvCxnSpPr>
+                <a:stCxn id="80" idx="0"/>
+                <a:endCxn id="84" idx="4"/>
+              </p:cNvCxnSpPr>
+              <p:nvPr/>
+            </p:nvCxnSpPr>
+            <p:spPr>
+              <a:xfrm flipV="1">
+                <a:off x="1371600" y="3753584"/>
+                <a:ext cx="914400" cy="457200"/>
+              </a:xfrm>
+              <a:prstGeom prst="straightConnector1">
+                <a:avLst/>
+              </a:prstGeom>
+              <a:ln w="19050" cmpd="sng">
+                <a:solidFill>
+                  <a:srgbClr val="0000FF"/>
+                </a:solidFill>
+                <a:tailEnd type="arrow"/>
+              </a:ln>
+            </p:spPr>
+            <p:style>
+              <a:lnRef idx="2">
+                <a:schemeClr val="accent1"/>
+              </a:lnRef>
+              <a:fillRef idx="0">
+                <a:schemeClr val="accent1"/>
+              </a:fillRef>
+              <a:effectRef idx="1">
+                <a:schemeClr val="accent1"/>
+              </a:effectRef>
+              <a:fontRef idx="minor">
+                <a:schemeClr val="tx1"/>
+              </a:fontRef>
+            </p:style>
+          </p:cxnSp>
+          <p:cxnSp>
+            <p:nvCxnSpPr>
+              <p:cNvPr id="90" name="Straight Arrow Connector 89"/>
+              <p:cNvCxnSpPr>
+                <a:stCxn id="81" idx="0"/>
+                <a:endCxn id="84" idx="4"/>
+              </p:cNvCxnSpPr>
+              <p:nvPr/>
+            </p:nvCxnSpPr>
+            <p:spPr>
+              <a:xfrm flipV="1">
+                <a:off x="2286000" y="3753584"/>
+                <a:ext cx="0" cy="457200"/>
+              </a:xfrm>
+              <a:prstGeom prst="straightConnector1">
+                <a:avLst/>
+              </a:prstGeom>
+              <a:ln w="19050" cmpd="sng">
+                <a:solidFill>
+                  <a:srgbClr val="0000FF"/>
+                </a:solidFill>
+                <a:tailEnd type="arrow"/>
+              </a:ln>
+            </p:spPr>
+            <p:style>
+              <a:lnRef idx="2">
+                <a:schemeClr val="accent1"/>
+              </a:lnRef>
+              <a:fillRef idx="0">
+                <a:schemeClr val="accent1"/>
+              </a:fillRef>
+              <a:effectRef idx="1">
+                <a:schemeClr val="accent1"/>
+              </a:effectRef>
+              <a:fontRef idx="minor">
+                <a:schemeClr val="tx1"/>
+              </a:fontRef>
+            </p:style>
+          </p:cxnSp>
+          <p:cxnSp>
+            <p:nvCxnSpPr>
+              <p:cNvPr id="91" name="Straight Arrow Connector 90"/>
+              <p:cNvCxnSpPr>
+                <a:stCxn id="82" idx="0"/>
+                <a:endCxn id="84" idx="4"/>
+              </p:cNvCxnSpPr>
+              <p:nvPr/>
+            </p:nvCxnSpPr>
+            <p:spPr>
+              <a:xfrm flipH="1" flipV="1">
+                <a:off x="2286000" y="3753584"/>
+                <a:ext cx="914400" cy="457200"/>
+              </a:xfrm>
+              <a:prstGeom prst="straightConnector1">
+                <a:avLst/>
+              </a:prstGeom>
+              <a:ln w="19050" cmpd="sng">
+                <a:solidFill>
+                  <a:srgbClr val="0000FF"/>
+                </a:solidFill>
+                <a:tailEnd type="arrow"/>
+              </a:ln>
+            </p:spPr>
+            <p:style>
+              <a:lnRef idx="2">
+                <a:schemeClr val="accent1"/>
+              </a:lnRef>
+              <a:fillRef idx="0">
+                <a:schemeClr val="accent1"/>
+              </a:fillRef>
+              <a:effectRef idx="1">
+                <a:schemeClr val="accent1"/>
+              </a:effectRef>
+              <a:fontRef idx="minor">
+                <a:schemeClr val="tx1"/>
+              </a:fontRef>
+            </p:style>
+          </p:cxnSp>
+          <p:cxnSp>
+            <p:nvCxnSpPr>
+              <p:cNvPr id="131" name="Straight Connector 130"/>
+              <p:cNvCxnSpPr>
+                <a:stCxn id="79" idx="3"/>
+                <a:endCxn id="76" idx="0"/>
+              </p:cNvCxnSpPr>
+              <p:nvPr/>
+            </p:nvCxnSpPr>
+            <p:spPr>
+              <a:xfrm flipH="1">
+                <a:off x="1371600" y="1857829"/>
+                <a:ext cx="752755" cy="524155"/>
+              </a:xfrm>
+              <a:prstGeom prst="line">
+                <a:avLst/>
+              </a:prstGeom>
+              <a:ln w="19050" cmpd="sng">
+                <a:solidFill>
+                  <a:srgbClr val="000000"/>
+                </a:solidFill>
+              </a:ln>
+            </p:spPr>
+            <p:style>
+              <a:lnRef idx="2">
+                <a:schemeClr val="accent1"/>
+              </a:lnRef>
+              <a:fillRef idx="0">
+                <a:schemeClr val="accent1"/>
+              </a:fillRef>
+              <a:effectRef idx="1">
+                <a:schemeClr val="accent1"/>
+              </a:effectRef>
+              <a:fontRef idx="minor">
+                <a:schemeClr val="tx1"/>
+              </a:fontRef>
+            </p:style>
+          </p:cxnSp>
+          <p:cxnSp>
+            <p:nvCxnSpPr>
+              <p:cNvPr id="133" name="Straight Connector 132"/>
+              <p:cNvCxnSpPr>
+                <a:stCxn id="79" idx="5"/>
+                <a:endCxn id="78" idx="0"/>
+              </p:cNvCxnSpPr>
+              <p:nvPr/>
+            </p:nvCxnSpPr>
+            <p:spPr>
+              <a:xfrm>
+                <a:off x="2447645" y="1857829"/>
+                <a:ext cx="752755" cy="524155"/>
+              </a:xfrm>
+              <a:prstGeom prst="line">
+                <a:avLst/>
+              </a:prstGeom>
+              <a:ln w="19050" cmpd="sng">
+                <a:solidFill>
+                  <a:srgbClr val="000000"/>
+                </a:solidFill>
+              </a:ln>
+            </p:spPr>
+            <p:style>
+              <a:lnRef idx="2">
+                <a:schemeClr val="accent1"/>
+              </a:lnRef>
+              <a:fillRef idx="0">
+                <a:schemeClr val="accent1"/>
+              </a:fillRef>
+              <a:effectRef idx="1">
+                <a:schemeClr val="accent1"/>
+              </a:effectRef>
+              <a:fontRef idx="minor">
+                <a:schemeClr val="tx1"/>
+              </a:fontRef>
+            </p:style>
+          </p:cxnSp>
+          <p:cxnSp>
+            <p:nvCxnSpPr>
+              <p:cNvPr id="135" name="Straight Connector 134"/>
+              <p:cNvCxnSpPr>
+                <a:stCxn id="76" idx="4"/>
+                <a:endCxn id="83" idx="0"/>
+              </p:cNvCxnSpPr>
+              <p:nvPr/>
+            </p:nvCxnSpPr>
+            <p:spPr>
+              <a:xfrm>
+                <a:off x="1371600" y="2839184"/>
+                <a:ext cx="0" cy="457200"/>
+              </a:xfrm>
+              <a:prstGeom prst="line">
+                <a:avLst/>
+              </a:prstGeom>
+              <a:ln w="19050" cmpd="sng">
+                <a:solidFill>
+                  <a:srgbClr val="000000"/>
+                </a:solidFill>
+              </a:ln>
+            </p:spPr>
+            <p:style>
+              <a:lnRef idx="2">
+                <a:schemeClr val="accent1"/>
+              </a:lnRef>
+              <a:fillRef idx="0">
+                <a:schemeClr val="accent1"/>
+              </a:fillRef>
+              <a:effectRef idx="1">
+                <a:schemeClr val="accent1"/>
+              </a:effectRef>
+              <a:fontRef idx="minor">
+                <a:schemeClr val="tx1"/>
+              </a:fontRef>
+            </p:style>
+          </p:cxnSp>
+          <p:cxnSp>
+            <p:nvCxnSpPr>
+              <p:cNvPr id="137" name="Straight Connector 136"/>
+              <p:cNvCxnSpPr>
+                <a:stCxn id="78" idx="4"/>
+                <a:endCxn id="85" idx="0"/>
+              </p:cNvCxnSpPr>
+              <p:nvPr/>
+            </p:nvCxnSpPr>
+            <p:spPr>
+              <a:xfrm>
+                <a:off x="3200400" y="2839184"/>
+                <a:ext cx="0" cy="457200"/>
+              </a:xfrm>
+              <a:prstGeom prst="line">
+                <a:avLst/>
+              </a:prstGeom>
+              <a:ln w="19050" cmpd="sng">
+                <a:solidFill>
+                  <a:srgbClr val="000000"/>
+                </a:solidFill>
+              </a:ln>
+            </p:spPr>
+            <p:style>
+              <a:lnRef idx="2">
+                <a:schemeClr val="accent1"/>
+              </a:lnRef>
+              <a:fillRef idx="0">
+                <a:schemeClr val="accent1"/>
+              </a:fillRef>
+              <a:effectRef idx="1">
+                <a:schemeClr val="accent1"/>
+              </a:effectRef>
+              <a:fontRef idx="minor">
+                <a:schemeClr val="tx1"/>
+              </a:fontRef>
+            </p:style>
+          </p:cxnSp>
+          <p:cxnSp>
+            <p:nvCxnSpPr>
+              <p:cNvPr id="143" name="Straight Connector 142"/>
+              <p:cNvCxnSpPr>
+                <a:stCxn id="85" idx="0"/>
+                <a:endCxn id="77" idx="4"/>
+              </p:cNvCxnSpPr>
+              <p:nvPr/>
+            </p:nvCxnSpPr>
+            <p:spPr>
+              <a:xfrm flipH="1" flipV="1">
+                <a:off x="2286000" y="2839184"/>
+                <a:ext cx="914400" cy="457200"/>
+              </a:xfrm>
+              <a:prstGeom prst="line">
+                <a:avLst/>
+              </a:prstGeom>
+              <a:ln w="19050" cmpd="sng">
+                <a:solidFill>
+                  <a:srgbClr val="000000"/>
+                </a:solidFill>
+              </a:ln>
+            </p:spPr>
+            <p:style>
+              <a:lnRef idx="2">
+                <a:schemeClr val="accent1"/>
+              </a:lnRef>
+              <a:fillRef idx="0">
+                <a:schemeClr val="accent1"/>
+              </a:fillRef>
+              <a:effectRef idx="1">
+                <a:schemeClr val="accent1"/>
+              </a:effectRef>
+              <a:fontRef idx="minor">
+                <a:schemeClr val="tx1"/>
+              </a:fontRef>
+            </p:style>
+          </p:cxnSp>
+          <p:cxnSp>
+            <p:nvCxnSpPr>
+              <p:cNvPr id="145" name="Straight Connector 144"/>
+              <p:cNvCxnSpPr>
+                <a:stCxn id="85" idx="0"/>
+                <a:endCxn id="76" idx="4"/>
+              </p:cNvCxnSpPr>
+              <p:nvPr/>
+            </p:nvCxnSpPr>
+            <p:spPr>
+              <a:xfrm flipH="1" flipV="1">
+                <a:off x="1371600" y="2839184"/>
+                <a:ext cx="1828800" cy="457200"/>
+              </a:xfrm>
+              <a:prstGeom prst="line">
+                <a:avLst/>
+              </a:prstGeom>
+              <a:ln w="19050" cmpd="sng">
+                <a:solidFill>
+                  <a:srgbClr val="000000"/>
+                </a:solidFill>
+              </a:ln>
+            </p:spPr>
+            <p:style>
+              <a:lnRef idx="2">
+                <a:schemeClr val="accent1"/>
+              </a:lnRef>
+              <a:fillRef idx="0">
+                <a:schemeClr val="accent1"/>
+              </a:fillRef>
+              <a:effectRef idx="1">
+                <a:schemeClr val="accent1"/>
+              </a:effectRef>
+              <a:fontRef idx="minor">
+                <a:schemeClr val="tx1"/>
+              </a:fontRef>
+            </p:style>
+          </p:cxnSp>
+          <p:cxnSp>
+            <p:nvCxnSpPr>
+              <p:cNvPr id="147" name="Straight Connector 146"/>
+              <p:cNvCxnSpPr>
+                <a:stCxn id="83" idx="0"/>
+                <a:endCxn id="78" idx="4"/>
+              </p:cNvCxnSpPr>
+              <p:nvPr/>
+            </p:nvCxnSpPr>
+            <p:spPr>
+              <a:xfrm flipV="1">
+                <a:off x="1371600" y="2839184"/>
+                <a:ext cx="1828800" cy="457200"/>
+              </a:xfrm>
+              <a:prstGeom prst="line">
+                <a:avLst/>
+              </a:prstGeom>
+              <a:ln w="19050" cmpd="sng">
+                <a:solidFill>
+                  <a:srgbClr val="000000"/>
+                </a:solidFill>
+              </a:ln>
+            </p:spPr>
+            <p:style>
+              <a:lnRef idx="2">
+                <a:schemeClr val="accent1"/>
+              </a:lnRef>
+              <a:fillRef idx="0">
+                <a:schemeClr val="accent1"/>
+              </a:fillRef>
+              <a:effectRef idx="1">
+                <a:schemeClr val="accent1"/>
+              </a:effectRef>
+              <a:fontRef idx="minor">
+                <a:schemeClr val="tx1"/>
+              </a:fontRef>
+            </p:style>
+          </p:cxnSp>
+          <p:cxnSp>
+            <p:nvCxnSpPr>
+              <p:cNvPr id="149" name="Straight Connector 148"/>
+              <p:cNvCxnSpPr>
+                <a:stCxn id="83" idx="0"/>
+                <a:endCxn id="77" idx="4"/>
+              </p:cNvCxnSpPr>
+              <p:nvPr/>
+            </p:nvCxnSpPr>
+            <p:spPr>
+              <a:xfrm flipV="1">
+                <a:off x="1371600" y="2839184"/>
+                <a:ext cx="914400" cy="457200"/>
+              </a:xfrm>
+              <a:prstGeom prst="line">
+                <a:avLst/>
+              </a:prstGeom>
+              <a:ln w="19050" cmpd="sng">
+                <a:solidFill>
+                  <a:srgbClr val="000000"/>
+                </a:solidFill>
+              </a:ln>
+            </p:spPr>
+            <p:style>
+              <a:lnRef idx="2">
+                <a:schemeClr val="accent1"/>
+              </a:lnRef>
+              <a:fillRef idx="0">
+                <a:schemeClr val="accent1"/>
+              </a:fillRef>
+              <a:effectRef idx="1">
+                <a:schemeClr val="accent1"/>
+              </a:effectRef>
+              <a:fontRef idx="minor">
+                <a:schemeClr val="tx1"/>
+              </a:fontRef>
+            </p:style>
+          </p:cxnSp>
+          <p:cxnSp>
+            <p:nvCxnSpPr>
+              <p:cNvPr id="151" name="Straight Arrow Connector 150"/>
+              <p:cNvCxnSpPr>
+                <a:stCxn id="76" idx="4"/>
+                <a:endCxn id="84" idx="0"/>
+              </p:cNvCxnSpPr>
+              <p:nvPr/>
+            </p:nvCxnSpPr>
+            <p:spPr>
+              <a:xfrm>
+                <a:off x="1371600" y="2839184"/>
+                <a:ext cx="914400" cy="457200"/>
+              </a:xfrm>
+              <a:prstGeom prst="straightConnector1">
+                <a:avLst/>
+              </a:prstGeom>
+              <a:ln w="19050" cmpd="sng">
+                <a:solidFill>
+                  <a:srgbClr val="FF0000"/>
+                </a:solidFill>
+                <a:tailEnd type="arrow"/>
+              </a:ln>
+            </p:spPr>
+            <p:style>
+              <a:lnRef idx="2">
+                <a:schemeClr val="accent1"/>
+              </a:lnRef>
+              <a:fillRef idx="0">
+                <a:schemeClr val="accent1"/>
+              </a:fillRef>
+              <a:effectRef idx="1">
+                <a:schemeClr val="accent1"/>
+              </a:effectRef>
+              <a:fontRef idx="minor">
+                <a:schemeClr val="tx1"/>
+              </a:fontRef>
+            </p:style>
+          </p:cxnSp>
+          <p:cxnSp>
+            <p:nvCxnSpPr>
+              <p:cNvPr id="153" name="Straight Arrow Connector 152"/>
+              <p:cNvCxnSpPr>
+                <a:stCxn id="78" idx="4"/>
+                <a:endCxn id="84" idx="0"/>
+              </p:cNvCxnSpPr>
+              <p:nvPr/>
+            </p:nvCxnSpPr>
+            <p:spPr>
+              <a:xfrm flipH="1">
+                <a:off x="2286000" y="2839184"/>
+                <a:ext cx="914400" cy="457200"/>
+              </a:xfrm>
+              <a:prstGeom prst="straightConnector1">
+                <a:avLst/>
+              </a:prstGeom>
+              <a:ln w="19050" cmpd="sng">
+                <a:solidFill>
+                  <a:srgbClr val="FF0000"/>
+                </a:solidFill>
+                <a:tailEnd type="arrow"/>
+              </a:ln>
+            </p:spPr>
+            <p:style>
+              <a:lnRef idx="2">
+                <a:schemeClr val="accent1"/>
+              </a:lnRef>
+              <a:fillRef idx="0">
+                <a:schemeClr val="accent1"/>
+              </a:fillRef>
+              <a:effectRef idx="1">
+                <a:schemeClr val="accent1"/>
+              </a:effectRef>
+              <a:fontRef idx="minor">
+                <a:schemeClr val="tx1"/>
+              </a:fontRef>
+            </p:style>
+          </p:cxnSp>
+          <p:cxnSp>
+            <p:nvCxnSpPr>
+              <p:cNvPr id="155" name="Straight Arrow Connector 154"/>
+              <p:cNvCxnSpPr>
+                <a:stCxn id="77" idx="4"/>
+                <a:endCxn id="84" idx="0"/>
+              </p:cNvCxnSpPr>
+              <p:nvPr/>
+            </p:nvCxnSpPr>
+            <p:spPr>
+              <a:xfrm>
+                <a:off x="2286000" y="2839184"/>
+                <a:ext cx="0" cy="457200"/>
+              </a:xfrm>
+              <a:prstGeom prst="straightConnector1">
+                <a:avLst/>
+              </a:prstGeom>
+              <a:ln w="19050" cmpd="sng">
+                <a:solidFill>
+                  <a:srgbClr val="FF0000"/>
+                </a:solidFill>
+                <a:tailEnd type="arrow"/>
+              </a:ln>
+            </p:spPr>
+            <p:style>
+              <a:lnRef idx="2">
+                <a:schemeClr val="accent1"/>
+              </a:lnRef>
+              <a:fillRef idx="0">
+                <a:schemeClr val="accent1"/>
+              </a:fillRef>
+              <a:effectRef idx="1">
+                <a:schemeClr val="accent1"/>
+              </a:effectRef>
+              <a:fontRef idx="minor">
+                <a:schemeClr val="tx1"/>
+              </a:fontRef>
+            </p:style>
+          </p:cxnSp>
+          <p:cxnSp>
+            <p:nvCxnSpPr>
+              <p:cNvPr id="157" name="Straight Connector 156"/>
+              <p:cNvCxnSpPr>
+                <a:stCxn id="83" idx="4"/>
+                <a:endCxn id="80" idx="0"/>
+              </p:cNvCxnSpPr>
+              <p:nvPr/>
+            </p:nvCxnSpPr>
+            <p:spPr>
+              <a:xfrm>
+                <a:off x="1371600" y="3753584"/>
+                <a:ext cx="0" cy="457200"/>
+              </a:xfrm>
+              <a:prstGeom prst="line">
+                <a:avLst/>
+              </a:prstGeom>
+              <a:ln w="19050" cmpd="sng">
+                <a:solidFill>
+                  <a:srgbClr val="000000"/>
+                </a:solidFill>
+              </a:ln>
+            </p:spPr>
+            <p:style>
+              <a:lnRef idx="2">
+                <a:schemeClr val="accent1"/>
+              </a:lnRef>
+              <a:fillRef idx="0">
+                <a:schemeClr val="accent1"/>
+              </a:fillRef>
+              <a:effectRef idx="1">
+                <a:schemeClr val="accent1"/>
+              </a:effectRef>
+              <a:fontRef idx="minor">
+                <a:schemeClr val="tx1"/>
+              </a:fontRef>
+            </p:style>
+          </p:cxnSp>
+          <p:cxnSp>
+            <p:nvCxnSpPr>
+              <p:cNvPr id="159" name="Straight Connector 158"/>
+              <p:cNvCxnSpPr>
+                <a:stCxn id="85" idx="4"/>
+                <a:endCxn id="82" idx="0"/>
+              </p:cNvCxnSpPr>
+              <p:nvPr/>
+            </p:nvCxnSpPr>
+            <p:spPr>
+              <a:xfrm>
+                <a:off x="3200400" y="3753584"/>
+                <a:ext cx="0" cy="457200"/>
+              </a:xfrm>
+              <a:prstGeom prst="line">
+                <a:avLst/>
+              </a:prstGeom>
+              <a:ln w="19050" cmpd="sng">
+                <a:solidFill>
+                  <a:srgbClr val="000000"/>
+                </a:solidFill>
+              </a:ln>
+            </p:spPr>
+            <p:style>
+              <a:lnRef idx="2">
+                <a:schemeClr val="accent1"/>
+              </a:lnRef>
+              <a:fillRef idx="0">
+                <a:schemeClr val="accent1"/>
+              </a:fillRef>
+              <a:effectRef idx="1">
+                <a:schemeClr val="accent1"/>
+              </a:effectRef>
+              <a:fontRef idx="minor">
+                <a:schemeClr val="tx1"/>
+              </a:fontRef>
+            </p:style>
+          </p:cxnSp>
+          <p:cxnSp>
+            <p:nvCxnSpPr>
+              <p:cNvPr id="161" name="Straight Connector 160"/>
+              <p:cNvCxnSpPr>
+                <a:stCxn id="83" idx="4"/>
+                <a:endCxn id="82" idx="0"/>
+              </p:cNvCxnSpPr>
+              <p:nvPr/>
+            </p:nvCxnSpPr>
+            <p:spPr>
+              <a:xfrm>
+                <a:off x="1371600" y="3753584"/>
+                <a:ext cx="1828800" cy="457200"/>
+              </a:xfrm>
+              <a:prstGeom prst="line">
+                <a:avLst/>
+              </a:prstGeom>
+              <a:ln w="19050" cmpd="sng">
+                <a:solidFill>
+                  <a:srgbClr val="000000"/>
+                </a:solidFill>
+              </a:ln>
+            </p:spPr>
+            <p:style>
+              <a:lnRef idx="2">
+                <a:schemeClr val="accent1"/>
+              </a:lnRef>
+              <a:fillRef idx="0">
+                <a:schemeClr val="accent1"/>
+              </a:fillRef>
+              <a:effectRef idx="1">
+                <a:schemeClr val="accent1"/>
+              </a:effectRef>
+              <a:fontRef idx="minor">
+                <a:schemeClr val="tx1"/>
+              </a:fontRef>
+            </p:style>
+          </p:cxnSp>
+          <p:cxnSp>
+            <p:nvCxnSpPr>
+              <p:cNvPr id="163" name="Straight Connector 162"/>
+              <p:cNvCxnSpPr>
+                <a:stCxn id="85" idx="4"/>
+                <a:endCxn id="80" idx="0"/>
+              </p:cNvCxnSpPr>
+              <p:nvPr/>
+            </p:nvCxnSpPr>
+            <p:spPr>
+              <a:xfrm flipH="1">
+                <a:off x="1371600" y="3753584"/>
+                <a:ext cx="1828800" cy="457200"/>
+              </a:xfrm>
+              <a:prstGeom prst="line">
+                <a:avLst/>
+              </a:prstGeom>
+              <a:ln w="19050" cmpd="sng">
+                <a:solidFill>
+                  <a:srgbClr val="000000"/>
+                </a:solidFill>
+              </a:ln>
+            </p:spPr>
+            <p:style>
+              <a:lnRef idx="2">
+                <a:schemeClr val="accent1"/>
+              </a:lnRef>
+              <a:fillRef idx="0">
+                <a:schemeClr val="accent1"/>
+              </a:fillRef>
+              <a:effectRef idx="1">
+                <a:schemeClr val="accent1"/>
+              </a:effectRef>
+              <a:fontRef idx="minor">
+                <a:schemeClr val="tx1"/>
+              </a:fontRef>
+            </p:style>
+          </p:cxnSp>
+          <p:cxnSp>
+            <p:nvCxnSpPr>
+              <p:cNvPr id="165" name="Straight Connector 164"/>
+              <p:cNvCxnSpPr>
+                <a:endCxn id="81" idx="0"/>
+              </p:cNvCxnSpPr>
+              <p:nvPr/>
+            </p:nvCxnSpPr>
+            <p:spPr>
+              <a:xfrm>
+                <a:off x="1371600" y="3810110"/>
+                <a:ext cx="914400" cy="400674"/>
+              </a:xfrm>
+              <a:prstGeom prst="line">
+                <a:avLst/>
+              </a:prstGeom>
+              <a:ln w="19050" cmpd="sng">
+                <a:solidFill>
+                  <a:srgbClr val="000000"/>
+                </a:solidFill>
+              </a:ln>
+            </p:spPr>
+            <p:style>
+              <a:lnRef idx="2">
+                <a:schemeClr val="accent1"/>
+              </a:lnRef>
+              <a:fillRef idx="0">
+                <a:schemeClr val="accent1"/>
+              </a:fillRef>
+              <a:effectRef idx="1">
+                <a:schemeClr val="accent1"/>
+              </a:effectRef>
+              <a:fontRef idx="minor">
+                <a:schemeClr val="tx1"/>
+              </a:fontRef>
+            </p:style>
+          </p:cxnSp>
+          <p:cxnSp>
+            <p:nvCxnSpPr>
+              <p:cNvPr id="167" name="Straight Connector 166"/>
+              <p:cNvCxnSpPr>
+                <a:stCxn id="81" idx="0"/>
+                <a:endCxn id="85" idx="4"/>
+              </p:cNvCxnSpPr>
+              <p:nvPr/>
+            </p:nvCxnSpPr>
+            <p:spPr>
+              <a:xfrm flipV="1">
+                <a:off x="2286000" y="3753584"/>
+                <a:ext cx="914400" cy="457200"/>
+              </a:xfrm>
+              <a:prstGeom prst="line">
+                <a:avLst/>
+              </a:prstGeom>
+              <a:ln w="19050" cmpd="sng">
+                <a:solidFill>
+                  <a:srgbClr val="000000"/>
+                </a:solidFill>
+              </a:ln>
+            </p:spPr>
+            <p:style>
+              <a:lnRef idx="2">
+                <a:schemeClr val="accent1"/>
+              </a:lnRef>
+              <a:fillRef idx="0">
+                <a:schemeClr val="accent1"/>
+              </a:fillRef>
+              <a:effectRef idx="1">
+                <a:schemeClr val="accent1"/>
+              </a:effectRef>
+              <a:fontRef idx="minor">
+                <a:schemeClr val="tx1"/>
+              </a:fontRef>
+            </p:style>
+          </p:cxnSp>
+          <p:cxnSp>
+            <p:nvCxnSpPr>
+              <p:cNvPr id="170" name="Straight Connector 169"/>
+              <p:cNvCxnSpPr>
+                <a:stCxn id="77" idx="0"/>
+                <a:endCxn id="79" idx="4"/>
+              </p:cNvCxnSpPr>
+              <p:nvPr/>
+            </p:nvCxnSpPr>
+            <p:spPr>
+              <a:xfrm flipV="1">
+                <a:off x="2286000" y="1924784"/>
+                <a:ext cx="0" cy="457200"/>
+              </a:xfrm>
+              <a:prstGeom prst="line">
+                <a:avLst/>
+              </a:prstGeom>
+              <a:ln w="19050" cmpd="sng">
+                <a:solidFill>
+                  <a:schemeClr val="tx1"/>
+                </a:solidFill>
+              </a:ln>
+            </p:spPr>
+            <p:style>
+              <a:lnRef idx="2">
+                <a:schemeClr val="accent1"/>
+              </a:lnRef>
+              <a:fillRef idx="0">
+                <a:schemeClr val="accent1"/>
+              </a:fillRef>
+              <a:effectRef idx="1">
+                <a:schemeClr val="accent1"/>
+              </a:effectRef>
+              <a:fontRef idx="minor">
+                <a:schemeClr val="tx1"/>
+              </a:fontRef>
+            </p:style>
+          </p:cxnSp>
+        </p:grpSp>
+        <p:pic>
+          <p:nvPicPr>
+            <p:cNvPr id="173" name="Picture 172" descr="panda_loc.png"/>
+            <p:cNvPicPr>
+              <a:picLocks noChangeAspect="1"/>
+            </p:cNvPicPr>
+            <p:nvPr/>
+          </p:nvPicPr>
+          <p:blipFill>
+            <a:blip r:embed="rId5">
+              <a:extLst>
+                <a:ext uri="{28A0092B-C50C-407E-A947-70E740481C1C}">
+                  <a14:useLocalDpi xmlns:a14="http://schemas.microsoft.com/office/drawing/2010/main" val="0"/>
+                </a:ext>
+              </a:extLst>
+            </a:blip>
+            <a:stretch>
+              <a:fillRect/>
+            </a:stretch>
+          </p:blipFill>
+          <p:spPr>
+            <a:xfrm>
+              <a:off x="5953945" y="3441329"/>
+              <a:ext cx="2281167" cy="2286000"/>
+            </a:xfrm>
+            <a:prstGeom prst="rect">
+              <a:avLst/>
+            </a:prstGeom>
+          </p:spPr>
+        </p:pic>
+      </p:grpSp>
+    </p:spTree>
+    <p:extLst>
+      <p:ext uri="{BB962C8B-B14F-4D97-AF65-F5344CB8AC3E}">
+        <p14:creationId xmlns:p14="http://schemas.microsoft.com/office/powerpoint/2010/main" val="3431166900"/>
       </p:ext>
     </p:extLst>
   </p:cSld>

</xml_diff>